<commit_message>
Page modification ads && delete ads fonction are implemanted
</commit_message>
<xml_diff>
--- a/Documentation/Presentation/presentation_annonce_a.pptx
+++ b/Documentation/Presentation/presentation_annonce_a.pptx
@@ -10,6 +10,7 @@
     <p:sldId id="258" r:id="rId4"/>
     <p:sldId id="259" r:id="rId5"/>
     <p:sldId id="260" r:id="rId6"/>
+    <p:sldId id="261" r:id="rId7"/>
   </p:sldIdLst>
   <p:sldSz cx="9144000" cy="5143500" type="screen16x9"/>
   <p:notesSz cx="6858000" cy="9144000"/>
@@ -15107,15 +15108,17 @@
             </a:r>
             <a:r>
               <a:rPr lang="fr-FR" dirty="0" smtClean="0"/>
-              <a:t>âcherais de réfléchir </a:t>
+              <a:t>âcherais de réfléchir a l’ampleur de mon travail avant de travailler</a:t>
             </a:r>
+          </a:p>
+          <a:p>
             <a:r>
-              <a:rPr lang="fr-FR" smtClean="0"/>
-              <a:t>a l’ampleur </a:t>
+              <a:rPr lang="fr-FR" dirty="0" smtClean="0"/>
+              <a:t>J</a:t>
             </a:r>
             <a:r>
               <a:rPr lang="fr-FR" dirty="0" smtClean="0"/>
-              <a:t>de mon travail</a:t>
+              <a:t>e suis fier de ce que j’ai accompli</a:t>
             </a:r>
             <a:endParaRPr lang="fr-FR" dirty="0"/>
           </a:p>
@@ -15148,6 +15151,91 @@
     <p:extLst>
       <p:ext uri="{BB962C8B-B14F-4D97-AF65-F5344CB8AC3E}">
         <p14:creationId xmlns:p14="http://schemas.microsoft.com/office/powerpoint/2010/main" val="755559976"/>
+      </p:ext>
+    </p:extLst>
+  </p:cSld>
+  <p:clrMapOvr>
+    <a:masterClrMapping/>
+  </p:clrMapOvr>
+</p:sld>
+</file>
+
+<file path=ppt/slides/slide6.xml><?xml version="1.0" encoding="utf-8"?>
+<p:sld xmlns:a="http://schemas.openxmlformats.org/drawingml/2006/main" xmlns:r="http://schemas.openxmlformats.org/officeDocument/2006/relationships" xmlns:p="http://schemas.openxmlformats.org/presentationml/2006/main">
+  <p:cSld>
+    <p:spTree>
+      <p:nvGrpSpPr>
+        <p:cNvPr id="1" name=""/>
+        <p:cNvGrpSpPr/>
+        <p:nvPr/>
+      </p:nvGrpSpPr>
+      <p:grpSpPr>
+        <a:xfrm>
+          <a:off x="0" y="0"/>
+          <a:ext cx="0" cy="0"/>
+          <a:chOff x="0" y="0"/>
+          <a:chExt cx="0" cy="0"/>
+        </a:xfrm>
+      </p:grpSpPr>
+      <p:sp>
+        <p:nvSpPr>
+          <p:cNvPr id="2" name="Espace réservé du contenu 1"/>
+          <p:cNvSpPr>
+            <a:spLocks noGrp="1"/>
+          </p:cNvSpPr>
+          <p:nvPr>
+            <p:ph idx="1"/>
+          </p:nvPr>
+        </p:nvSpPr>
+        <p:spPr/>
+        <p:txBody>
+          <a:bodyPr>
+            <a:normAutofit/>
+          </a:bodyPr>
+          <a:lstStyle/>
+          <a:p>
+            <a:pPr marL="0" indent="0" algn="ctr">
+              <a:buNone/>
+            </a:pPr>
+            <a:r>
+              <a:rPr lang="fr-FR" sz="15000" dirty="0" smtClean="0"/>
+              <a:t>? </a:t>
+            </a:r>
+            <a:r>
+              <a:rPr lang="fr-FR" sz="15000" smtClean="0"/>
+              <a:t>/ !</a:t>
+            </a:r>
+            <a:endParaRPr lang="fr-FR" sz="15000" dirty="0"/>
+          </a:p>
+        </p:txBody>
+      </p:sp>
+      <p:sp>
+        <p:nvSpPr>
+          <p:cNvPr id="3" name="Titre 2"/>
+          <p:cNvSpPr>
+            <a:spLocks noGrp="1"/>
+          </p:cNvSpPr>
+          <p:nvPr>
+            <p:ph type="title"/>
+          </p:nvPr>
+        </p:nvSpPr>
+        <p:spPr/>
+        <p:txBody>
+          <a:bodyPr/>
+          <a:lstStyle/>
+          <a:p>
+            <a:r>
+              <a:rPr lang="fr-FR" dirty="0" smtClean="0"/>
+              <a:t>Questions / remarques</a:t>
+            </a:r>
+            <a:endParaRPr lang="fr-FR" dirty="0"/>
+          </a:p>
+        </p:txBody>
+      </p:sp>
+    </p:spTree>
+    <p:extLst>
+      <p:ext uri="{BB962C8B-B14F-4D97-AF65-F5344CB8AC3E}">
+        <p14:creationId xmlns:p14="http://schemas.microsoft.com/office/powerpoint/2010/main" val="785435421"/>
       </p:ext>
     </p:extLst>
   </p:cSld>

</xml_diff>